<commit_message>
further updates to ppt based on feedback and updates to notebook
</commit_message>
<xml_diff>
--- a/Phase 3 Presentation.pptx
+++ b/Phase 3 Presentation.pptx
@@ -13,7 +13,7 @@
     <p:sldId id="259" r:id="rId4"/>
     <p:sldId id="273" r:id="rId5"/>
     <p:sldId id="274" r:id="rId6"/>
-    <p:sldId id="260" r:id="rId7"/>
+    <p:sldId id="275" r:id="rId7"/>
     <p:sldId id="272" r:id="rId8"/>
     <p:sldId id="262" r:id="rId9"/>
     <p:sldId id="269" r:id="rId10"/>
@@ -1338,7 +1338,7 @@
   <p:cSld>
     <p:spTree>
       <p:nvGrpSpPr>
-        <p:cNvPr id="1" name="Shape 253"/>
+        <p:cNvPr id="1" name="Shape 222"/>
         <p:cNvGrpSpPr/>
         <p:nvPr/>
       </p:nvGrpSpPr>
@@ -1352,7 +1352,7 @@
       </p:grpSpPr>
       <p:sp>
         <p:nvSpPr>
-          <p:cNvPr id="254" name="Google Shape;254;g14339cc84c5_0_29:notes"/>
+          <p:cNvPr id="223" name="Google Shape;223;g535dfb2784_0_0:notes"/>
           <p:cNvSpPr>
             <a:spLocks noGrp="1" noRot="1" noChangeAspect="1"/>
           </p:cNvSpPr>
@@ -1393,7 +1393,7 @@
       </p:sp>
       <p:sp>
         <p:nvSpPr>
-          <p:cNvPr id="255" name="Google Shape;255;g14339cc84c5_0_29:notes"/>
+          <p:cNvPr id="224" name="Google Shape;224;g535dfb2784_0_0:notes"/>
           <p:cNvSpPr txBox="1">
             <a:spLocks noGrp="1"/>
           </p:cNvSpPr>
@@ -1430,6 +1430,11 @@
         </p:txBody>
       </p:sp>
     </p:spTree>
+    <p:extLst>
+      <p:ext uri="{BB962C8B-B14F-4D97-AF65-F5344CB8AC3E}">
+        <p14:creationId xmlns:p14="http://schemas.microsoft.com/office/powerpoint/2010/main" val="311725225"/>
+      </p:ext>
+    </p:extLst>
   </p:cSld>
   <p:clrMapOvr>
     <a:masterClrMapping/>
@@ -19416,7 +19421,11 @@
               <a:buNone/>
             </a:pPr>
             <a:r>
-              <a:rPr lang="en" dirty="0"/>
+              <a:rPr lang="en" dirty="0">
+                <a:solidFill>
+                  <a:schemeClr val="bg1"/>
+                </a:solidFill>
+              </a:rPr>
               <a:t>Presented by:</a:t>
             </a:r>
           </a:p>
@@ -19431,7 +19440,11 @@
               <a:buNone/>
             </a:pPr>
             <a:r>
-              <a:rPr lang="en-US" dirty="0"/>
+              <a:rPr lang="en-US" dirty="0">
+                <a:solidFill>
+                  <a:schemeClr val="bg1"/>
+                </a:solidFill>
+              </a:rPr>
               <a:t>Ali Rampurawala</a:t>
             </a:r>
           </a:p>
@@ -19446,10 +19459,18 @@
               <a:buNone/>
             </a:pPr>
             <a:r>
-              <a:rPr lang="en-US" dirty="0"/>
+              <a:rPr lang="en-US" dirty="0">
+                <a:solidFill>
+                  <a:schemeClr val="bg1"/>
+                </a:solidFill>
+              </a:rPr>
               <a:t>Legendary Preds Inc.</a:t>
             </a:r>
-            <a:endParaRPr dirty="0"/>
+            <a:endParaRPr dirty="0">
+              <a:solidFill>
+                <a:schemeClr val="bg1"/>
+              </a:solidFill>
+            </a:endParaRPr>
           </a:p>
         </p:txBody>
       </p:sp>
@@ -19528,8 +19549,8 @@
         </p:nvSpPr>
         <p:spPr>
           <a:xfrm>
-            <a:off x="942840" y="2421725"/>
-            <a:ext cx="7758900" cy="1900381"/>
+            <a:off x="932206" y="2288310"/>
+            <a:ext cx="7779899" cy="2081671"/>
           </a:xfrm>
           <a:prstGeom prst="rect">
             <a:avLst/>
@@ -19541,6 +19562,39 @@
           </a:bodyPr>
           <a:lstStyle/>
           <a:p>
+            <a:pPr marL="127000" lvl="0" indent="0" algn="l" rtl="0">
+              <a:spcBef>
+                <a:spcPts val="0"/>
+              </a:spcBef>
+              <a:spcAft>
+                <a:spcPts val="0"/>
+              </a:spcAft>
+              <a:buSzPts val="1600"/>
+            </a:pPr>
+            <a:r>
+              <a:rPr lang="en-US" sz="1800" dirty="0">
+                <a:latin typeface="Arial" panose="020B0604020202020204" pitchFamily="34" charset="0"/>
+                <a:cs typeface="Arial" panose="020B0604020202020204" pitchFamily="34" charset="0"/>
+              </a:rPr>
+              <a:t>If given additional time…</a:t>
+            </a:r>
+          </a:p>
+          <a:p>
+            <a:pPr marL="127000" lvl="0" indent="0" algn="l" rtl="0">
+              <a:spcBef>
+                <a:spcPts val="0"/>
+              </a:spcBef>
+              <a:spcAft>
+                <a:spcPts val="0"/>
+              </a:spcAft>
+              <a:buSzPts val="1600"/>
+            </a:pPr>
+            <a:endParaRPr lang="en-US" sz="1800" dirty="0">
+              <a:latin typeface="Arial" panose="020B0604020202020204" pitchFamily="34" charset="0"/>
+              <a:cs typeface="Arial" panose="020B0604020202020204" pitchFamily="34" charset="0"/>
+            </a:endParaRPr>
+          </a:p>
+          <a:p>
             <a:pPr marL="457200" lvl="0" indent="-330200" algn="l" rtl="0">
               <a:spcBef>
                 <a:spcPts val="0"/>
@@ -19557,7 +19611,7 @@
                 <a:latin typeface="Arial" panose="020B0604020202020204" pitchFamily="34" charset="0"/>
                 <a:cs typeface="Arial" panose="020B0604020202020204" pitchFamily="34" charset="0"/>
               </a:rPr>
-              <a:t>Consider further tuning the model to increase the “recall” score </a:t>
+              <a:t>Further tune the model to increase the “recall” score </a:t>
             </a:r>
           </a:p>
           <a:p>
@@ -19594,7 +19648,7 @@
                 <a:latin typeface="Arial" panose="020B0604020202020204" pitchFamily="34" charset="0"/>
                 <a:cs typeface="Arial" panose="020B0604020202020204" pitchFamily="34" charset="0"/>
               </a:rPr>
-              <a:t>Continue to add data each quarter and reconfigure model</a:t>
+              <a:t>Continue to add data each quarter and update model</a:t>
             </a:r>
           </a:p>
           <a:p>
@@ -19631,7 +19685,7 @@
                 <a:latin typeface="Arial" panose="020B0604020202020204" pitchFamily="34" charset="0"/>
                 <a:cs typeface="Arial" panose="020B0604020202020204" pitchFamily="34" charset="0"/>
               </a:rPr>
-              <a:t>Follow-through with recommendations</a:t>
+              <a:t>Analyze new customer data to help identify potential trends</a:t>
             </a:r>
             <a:endParaRPr sz="1800" dirty="0">
               <a:latin typeface="Arial" panose="020B0604020202020204" pitchFamily="34" charset="0"/>
@@ -19745,6 +19799,10 @@
           </p:nvPr>
         </p:nvSpPr>
         <p:spPr>
+          <a:xfrm>
+            <a:off x="722374" y="435600"/>
+            <a:ext cx="5967538" cy="1016100"/>
+          </a:xfrm>
           <a:prstGeom prst="rect">
             <a:avLst/>
           </a:prstGeom>
@@ -19766,7 +19824,7 @@
             </a:pPr>
             <a:r>
               <a:rPr lang="en" dirty="0"/>
-              <a:t>Thanks….</a:t>
+              <a:t>Thank You….</a:t>
             </a:r>
             <a:endParaRPr dirty="0"/>
           </a:p>
@@ -21370,7 +21428,7 @@
                 <a:latin typeface="Arial" panose="020B0604020202020204" pitchFamily="34" charset="0"/>
                 <a:cs typeface="Arial" panose="020B0604020202020204" pitchFamily="34" charset="0"/>
               </a:rPr>
-              <a:t>Historical Data (~3,000+ records)</a:t>
+              <a:t>Historical Data (~3,300 records)</a:t>
             </a:r>
           </a:p>
           <a:p>
@@ -21424,7 +21482,7 @@
                 <a:latin typeface="Arial" panose="020B0604020202020204" pitchFamily="34" charset="0"/>
                 <a:cs typeface="Arial" panose="020B0604020202020204" pitchFamily="34" charset="0"/>
               </a:rPr>
-              <a:t>Minutes Usage</a:t>
+              <a:t>Minutes (day, eve, etc.)</a:t>
             </a:r>
           </a:p>
           <a:p>
@@ -21443,7 +21501,7 @@
                 <a:latin typeface="Arial" panose="020B0604020202020204" pitchFamily="34" charset="0"/>
                 <a:cs typeface="Arial" panose="020B0604020202020204" pitchFamily="34" charset="0"/>
               </a:rPr>
-              <a:t>Charges</a:t>
+              <a:t>Charges (day, eve, etc.)</a:t>
             </a:r>
           </a:p>
           <a:p>
@@ -21462,7 +21520,7 @@
                 <a:latin typeface="Arial" panose="020B0604020202020204" pitchFamily="34" charset="0"/>
                 <a:cs typeface="Arial" panose="020B0604020202020204" pitchFamily="34" charset="0"/>
               </a:rPr>
-              <a:t>Churn (yes – 85%  /  No – 15%)</a:t>
+              <a:t>Churn or no</a:t>
             </a:r>
           </a:p>
         </p:txBody>
@@ -21561,8 +21619,8 @@
         </p:blipFill>
         <p:spPr>
           <a:xfrm>
-            <a:off x="4269661" y="1748118"/>
-            <a:ext cx="4420784" cy="3319466"/>
+            <a:off x="4178595" y="1726102"/>
+            <a:ext cx="4511850" cy="3387845"/>
           </a:xfrm>
           <a:prstGeom prst="rect">
             <a:avLst/>
@@ -21887,7 +21945,7 @@
   <p:cSld>
     <p:spTree>
       <p:nvGrpSpPr>
-        <p:cNvPr id="1" name="Shape 256"/>
+        <p:cNvPr id="1" name="Shape 225"/>
         <p:cNvGrpSpPr/>
         <p:nvPr/>
       </p:nvGrpSpPr>
@@ -21901,7 +21959,7 @@
       </p:grpSpPr>
       <p:sp>
         <p:nvSpPr>
-          <p:cNvPr id="258" name="Google Shape;258;p30"/>
+          <p:cNvPr id="226" name="Google Shape;226;p29"/>
           <p:cNvSpPr txBox="1">
             <a:spLocks noGrp="1"/>
           </p:cNvSpPr>
@@ -21911,8 +21969,8 @@
         </p:nvSpPr>
         <p:spPr>
           <a:xfrm>
-            <a:off x="633282" y="591300"/>
-            <a:ext cx="7779900" cy="902220"/>
+            <a:off x="682200" y="593477"/>
+            <a:ext cx="7779600" cy="734700"/>
           </a:xfrm>
           <a:prstGeom prst="rect">
             <a:avLst/>
@@ -21934,23 +21992,19 @@
               <a:buNone/>
             </a:pPr>
             <a:r>
-              <a:rPr lang="en-US" dirty="0"/>
-              <a:t>Modeling Process</a:t>
+              <a:rPr lang="en" dirty="0"/>
+              <a:t>Initial Observations</a:t>
             </a:r>
-            <a:endParaRPr dirty="0">
-              <a:solidFill>
-                <a:schemeClr val="bg1"/>
-              </a:solidFill>
-            </a:endParaRPr>
+            <a:endParaRPr dirty="0"/>
           </a:p>
         </p:txBody>
       </p:sp>
       <p:sp>
         <p:nvSpPr>
-          <p:cNvPr id="2" name="Google Shape;227;p29">
+          <p:cNvPr id="9" name="Google Shape;230;p29">
             <a:extLst>
               <a:ext uri="{FF2B5EF4-FFF2-40B4-BE49-F238E27FC236}">
-                <a16:creationId xmlns:a16="http://schemas.microsoft.com/office/drawing/2014/main" id="{997D34B3-ABAE-ECD8-F1F3-EE574C14D917}"/>
+                <a16:creationId xmlns:a16="http://schemas.microsoft.com/office/drawing/2014/main" id="{B1C6EDB7-0719-D5C3-0610-157057DE13CA}"/>
               </a:ext>
             </a:extLst>
           </p:cNvPr>
@@ -21961,8 +22015,8 @@
         </p:nvSpPr>
         <p:spPr>
           <a:xfrm>
-            <a:off x="425619" y="2318308"/>
-            <a:ext cx="3683223" cy="2468274"/>
+            <a:off x="458584" y="2711301"/>
+            <a:ext cx="3113956" cy="2073083"/>
           </a:xfrm>
           <a:prstGeom prst="rect">
             <a:avLst/>
@@ -21974,7 +22028,7 @@
             <a:noAutofit/>
           </a:bodyPr>
           <a:lstStyle>
-            <a:lvl1pPr marL="257175" lvl="0" indent="-257175" algn="l" defTabSz="342900" rtl="0" eaLnBrk="1" latinLnBrk="0" hangingPunct="1">
+            <a:lvl1pPr marL="257175" lvl="0" indent="-257175" algn="ctr" defTabSz="342900" rtl="0" eaLnBrk="1" latinLnBrk="0" hangingPunct="1">
               <a:spcBef>
                 <a:spcPts val="0"/>
               </a:spcBef>
@@ -21982,24 +22036,45 @@
                 <a:spcPts val="0"/>
               </a:spcAft>
               <a:buClr>
-                <a:schemeClr val="accent1"/>
+                <a:schemeClr val="dk1"/>
+              </a:buClr>
+              <a:buSzPts val="2000"/>
+              <a:buFont typeface="Bebas Neue"/>
+              <a:buNone/>
+              <a:defRPr sz="2000" b="0" i="0" kern="1200">
+                <a:solidFill>
+                  <a:schemeClr val="dk1"/>
+                </a:solidFill>
+                <a:latin typeface="Bebas Neue"/>
+                <a:ea typeface="Bebas Neue"/>
+                <a:cs typeface="Bebas Neue"/>
+                <a:sym typeface="Bebas Neue"/>
+              </a:defRPr>
+            </a:lvl1pPr>
+            <a:lvl2pPr marL="557213" lvl="1" indent="-214313" algn="ctr" defTabSz="342900" rtl="0" eaLnBrk="1" latinLnBrk="0" hangingPunct="1">
+              <a:spcBef>
+                <a:spcPts val="1600"/>
+              </a:spcBef>
+              <a:spcAft>
+                <a:spcPts val="0"/>
+              </a:spcAft>
+              <a:buClr>
+                <a:schemeClr val="dk1"/>
               </a:buClr>
               <a:buSzPts val="1500"/>
-              <a:buFont typeface="Wingdings 3" charset="2"/>
-              <a:buNone/>
-              <a:defRPr sz="1350" b="0" i="0" kern="1200">
+              <a:buFont typeface="Bebas Neue"/>
+              <a:buNone/>
+              <a:defRPr sz="1200" b="0" i="0" kern="1200">
                 <a:solidFill>
-                  <a:schemeClr val="tx1">
-                    <a:lumMod val="75000"/>
-                    <a:lumOff val="25000"/>
-                  </a:schemeClr>
+                  <a:schemeClr val="dk1"/>
                 </a:solidFill>
-                <a:latin typeface="+mn-lt"/>
-                <a:ea typeface="+mn-ea"/>
-                <a:cs typeface="+mn-cs"/>
+                <a:latin typeface="Bebas Neue"/>
+                <a:ea typeface="Bebas Neue"/>
+                <a:cs typeface="Bebas Neue"/>
+                <a:sym typeface="Bebas Neue"/>
               </a:defRPr>
-            </a:lvl1pPr>
-            <a:lvl2pPr marL="557213" lvl="1" indent="-214313" algn="l" defTabSz="342900" rtl="0" eaLnBrk="1" latinLnBrk="0" hangingPunct="1">
+            </a:lvl2pPr>
+            <a:lvl3pPr marL="857250" lvl="2" indent="-171450" algn="ctr" defTabSz="342900" rtl="0" eaLnBrk="1" latinLnBrk="0" hangingPunct="1">
               <a:spcBef>
                 <a:spcPts val="1600"/>
               </a:spcBef>
@@ -22007,24 +22082,22 @@
                 <a:spcPts val="0"/>
               </a:spcAft>
               <a:buClr>
-                <a:schemeClr val="accent1"/>
+                <a:schemeClr val="dk1"/>
               </a:buClr>
               <a:buSzPts val="1500"/>
-              <a:buFont typeface="Wingdings 3" charset="2"/>
-              <a:buNone/>
-              <a:defRPr sz="1200" b="0" i="0" kern="1200">
+              <a:buFont typeface="Bebas Neue"/>
+              <a:buNone/>
+              <a:defRPr sz="1050" b="0" i="0" kern="1200">
                 <a:solidFill>
-                  <a:schemeClr val="tx1">
-                    <a:lumMod val="75000"/>
-                    <a:lumOff val="25000"/>
-                  </a:schemeClr>
+                  <a:schemeClr val="dk1"/>
                 </a:solidFill>
-                <a:latin typeface="+mn-lt"/>
-                <a:ea typeface="+mn-ea"/>
-                <a:cs typeface="+mn-cs"/>
+                <a:latin typeface="Bebas Neue"/>
+                <a:ea typeface="Bebas Neue"/>
+                <a:cs typeface="Bebas Neue"/>
+                <a:sym typeface="Bebas Neue"/>
               </a:defRPr>
-            </a:lvl2pPr>
-            <a:lvl3pPr marL="857250" lvl="2" indent="-171450" algn="l" defTabSz="342900" rtl="0" eaLnBrk="1" latinLnBrk="0" hangingPunct="1">
+            </a:lvl3pPr>
+            <a:lvl4pPr marL="1200150" lvl="3" indent="-171450" algn="ctr" defTabSz="342900" rtl="0" eaLnBrk="1" latinLnBrk="0" hangingPunct="1">
               <a:spcBef>
                 <a:spcPts val="1600"/>
               </a:spcBef>
@@ -22032,24 +22105,22 @@
                 <a:spcPts val="0"/>
               </a:spcAft>
               <a:buClr>
-                <a:schemeClr val="accent1"/>
+                <a:schemeClr val="dk1"/>
               </a:buClr>
               <a:buSzPts val="1500"/>
-              <a:buFont typeface="Wingdings 3" charset="2"/>
-              <a:buNone/>
-              <a:defRPr sz="1050" b="0" i="0" kern="1200">
+              <a:buFont typeface="Bebas Neue"/>
+              <a:buNone/>
+              <a:defRPr sz="900" b="0" i="0" kern="1200">
                 <a:solidFill>
-                  <a:schemeClr val="tx1">
-                    <a:lumMod val="75000"/>
-                    <a:lumOff val="25000"/>
-                  </a:schemeClr>
+                  <a:schemeClr val="dk1"/>
                 </a:solidFill>
-                <a:latin typeface="+mn-lt"/>
-                <a:ea typeface="+mn-ea"/>
-                <a:cs typeface="+mn-cs"/>
+                <a:latin typeface="Bebas Neue"/>
+                <a:ea typeface="Bebas Neue"/>
+                <a:cs typeface="Bebas Neue"/>
+                <a:sym typeface="Bebas Neue"/>
               </a:defRPr>
-            </a:lvl3pPr>
-            <a:lvl4pPr marL="1200150" lvl="3" indent="-171450" algn="l" defTabSz="342900" rtl="0" eaLnBrk="1" latinLnBrk="0" hangingPunct="1">
+            </a:lvl4pPr>
+            <a:lvl5pPr marL="1543050" lvl="4" indent="-171450" algn="ctr" defTabSz="342900" rtl="0" eaLnBrk="1" latinLnBrk="0" hangingPunct="1">
               <a:spcBef>
                 <a:spcPts val="1600"/>
               </a:spcBef>
@@ -22057,24 +22128,22 @@
                 <a:spcPts val="0"/>
               </a:spcAft>
               <a:buClr>
-                <a:schemeClr val="accent1"/>
+                <a:schemeClr val="dk1"/>
               </a:buClr>
               <a:buSzPts val="1500"/>
-              <a:buFont typeface="Wingdings 3" charset="2"/>
+              <a:buFont typeface="Bebas Neue"/>
               <a:buNone/>
               <a:defRPr sz="900" b="0" i="0" kern="1200">
                 <a:solidFill>
-                  <a:schemeClr val="tx1">
-                    <a:lumMod val="75000"/>
-                    <a:lumOff val="25000"/>
-                  </a:schemeClr>
+                  <a:schemeClr val="dk1"/>
                 </a:solidFill>
-                <a:latin typeface="+mn-lt"/>
-                <a:ea typeface="+mn-ea"/>
-                <a:cs typeface="+mn-cs"/>
+                <a:latin typeface="Bebas Neue"/>
+                <a:ea typeface="Bebas Neue"/>
+                <a:cs typeface="Bebas Neue"/>
+                <a:sym typeface="Bebas Neue"/>
               </a:defRPr>
-            </a:lvl4pPr>
-            <a:lvl5pPr marL="1543050" lvl="4" indent="-171450" algn="l" defTabSz="342900" rtl="0" eaLnBrk="1" latinLnBrk="0" hangingPunct="1">
+            </a:lvl5pPr>
+            <a:lvl6pPr marL="1885950" lvl="5" indent="-171450" algn="ctr" defTabSz="342900" rtl="0" eaLnBrk="1" latinLnBrk="0" hangingPunct="1">
               <a:spcBef>
                 <a:spcPts val="1600"/>
               </a:spcBef>
@@ -22082,24 +22151,22 @@
                 <a:spcPts val="0"/>
               </a:spcAft>
               <a:buClr>
-                <a:schemeClr val="accent1"/>
+                <a:schemeClr val="dk1"/>
               </a:buClr>
               <a:buSzPts val="1500"/>
-              <a:buFont typeface="Wingdings 3" charset="2"/>
+              <a:buFont typeface="Bebas Neue"/>
               <a:buNone/>
               <a:defRPr sz="900" b="0" i="0" kern="1200">
                 <a:solidFill>
-                  <a:schemeClr val="tx1">
-                    <a:lumMod val="75000"/>
-                    <a:lumOff val="25000"/>
-                  </a:schemeClr>
+                  <a:schemeClr val="dk1"/>
                 </a:solidFill>
-                <a:latin typeface="+mn-lt"/>
-                <a:ea typeface="+mn-ea"/>
-                <a:cs typeface="+mn-cs"/>
+                <a:latin typeface="Bebas Neue"/>
+                <a:ea typeface="Bebas Neue"/>
+                <a:cs typeface="Bebas Neue"/>
+                <a:sym typeface="Bebas Neue"/>
               </a:defRPr>
-            </a:lvl5pPr>
-            <a:lvl6pPr marL="1885950" lvl="5" indent="-171450" algn="l" defTabSz="342900" rtl="0" eaLnBrk="1" latinLnBrk="0" hangingPunct="1">
+            </a:lvl6pPr>
+            <a:lvl7pPr marL="2228850" lvl="6" indent="-171450" algn="ctr" defTabSz="342900" rtl="0" eaLnBrk="1" latinLnBrk="0" hangingPunct="1">
               <a:spcBef>
                 <a:spcPts val="1600"/>
               </a:spcBef>
@@ -22107,24 +22174,22 @@
                 <a:spcPts val="0"/>
               </a:spcAft>
               <a:buClr>
-                <a:schemeClr val="accent1"/>
+                <a:schemeClr val="dk1"/>
               </a:buClr>
               <a:buSzPts val="1500"/>
-              <a:buFont typeface="Wingdings 3" charset="2"/>
+              <a:buFont typeface="Bebas Neue"/>
               <a:buNone/>
               <a:defRPr sz="900" b="0" i="0" kern="1200">
                 <a:solidFill>
-                  <a:schemeClr val="tx1">
-                    <a:lumMod val="75000"/>
-                    <a:lumOff val="25000"/>
-                  </a:schemeClr>
+                  <a:schemeClr val="dk1"/>
                 </a:solidFill>
-                <a:latin typeface="+mn-lt"/>
-                <a:ea typeface="+mn-ea"/>
-                <a:cs typeface="+mn-cs"/>
+                <a:latin typeface="Bebas Neue"/>
+                <a:ea typeface="Bebas Neue"/>
+                <a:cs typeface="Bebas Neue"/>
+                <a:sym typeface="Bebas Neue"/>
               </a:defRPr>
-            </a:lvl6pPr>
-            <a:lvl7pPr marL="2228850" lvl="6" indent="-171450" algn="l" defTabSz="342900" rtl="0" eaLnBrk="1" latinLnBrk="0" hangingPunct="1">
+            </a:lvl7pPr>
+            <a:lvl8pPr marL="2571750" lvl="7" indent="-171450" algn="ctr" defTabSz="342900" rtl="0" eaLnBrk="1" latinLnBrk="0" hangingPunct="1">
               <a:spcBef>
                 <a:spcPts val="1600"/>
               </a:spcBef>
@@ -22132,127 +22197,114 @@
                 <a:spcPts val="0"/>
               </a:spcAft>
               <a:buClr>
-                <a:schemeClr val="accent1"/>
+                <a:schemeClr val="dk1"/>
               </a:buClr>
               <a:buSzPts val="1500"/>
-              <a:buFont typeface="Wingdings 3" charset="2"/>
+              <a:buFont typeface="Bebas Neue"/>
               <a:buNone/>
               <a:defRPr sz="900" b="0" i="0" kern="1200">
                 <a:solidFill>
-                  <a:schemeClr val="tx1">
-                    <a:lumMod val="75000"/>
-                    <a:lumOff val="25000"/>
-                  </a:schemeClr>
+                  <a:schemeClr val="dk1"/>
                 </a:solidFill>
-                <a:latin typeface="+mn-lt"/>
-                <a:ea typeface="+mn-ea"/>
-                <a:cs typeface="+mn-cs"/>
+                <a:latin typeface="Bebas Neue"/>
+                <a:ea typeface="Bebas Neue"/>
+                <a:cs typeface="Bebas Neue"/>
+                <a:sym typeface="Bebas Neue"/>
               </a:defRPr>
-            </a:lvl7pPr>
-            <a:lvl8pPr marL="2571750" lvl="7" indent="-171450" algn="l" defTabSz="342900" rtl="0" eaLnBrk="1" latinLnBrk="0" hangingPunct="1">
-              <a:spcBef>
-                <a:spcPts val="1600"/>
-              </a:spcBef>
-              <a:spcAft>
-                <a:spcPts val="0"/>
+            </a:lvl8pPr>
+            <a:lvl9pPr marL="2914650" lvl="8" indent="-171450" algn="ctr" defTabSz="342900" rtl="0" eaLnBrk="1" latinLnBrk="0" hangingPunct="1">
+              <a:spcBef>
+                <a:spcPts val="1600"/>
+              </a:spcBef>
+              <a:spcAft>
+                <a:spcPts val="1600"/>
               </a:spcAft>
               <a:buClr>
-                <a:schemeClr val="accent1"/>
+                <a:schemeClr val="dk1"/>
               </a:buClr>
               <a:buSzPts val="1500"/>
-              <a:buFont typeface="Wingdings 3" charset="2"/>
+              <a:buFont typeface="Bebas Neue"/>
               <a:buNone/>
               <a:defRPr sz="900" b="0" i="0" kern="1200">
                 <a:solidFill>
-                  <a:schemeClr val="tx1">
-                    <a:lumMod val="75000"/>
-                    <a:lumOff val="25000"/>
-                  </a:schemeClr>
+                  <a:schemeClr val="dk1"/>
                 </a:solidFill>
-                <a:latin typeface="+mn-lt"/>
-                <a:ea typeface="+mn-ea"/>
-                <a:cs typeface="+mn-cs"/>
-              </a:defRPr>
-            </a:lvl8pPr>
-            <a:lvl9pPr marL="2914650" lvl="8" indent="-171450" algn="l" defTabSz="342900" rtl="0" eaLnBrk="1" latinLnBrk="0" hangingPunct="1">
-              <a:spcBef>
-                <a:spcPts val="1600"/>
-              </a:spcBef>
-              <a:spcAft>
-                <a:spcPts val="1600"/>
-              </a:spcAft>
-              <a:buClr>
-                <a:schemeClr val="accent1"/>
-              </a:buClr>
-              <a:buSzPts val="1500"/>
-              <a:buFont typeface="Wingdings 3" charset="2"/>
-              <a:buNone/>
-              <a:defRPr sz="900" b="0" i="0" kern="1200">
-                <a:solidFill>
-                  <a:schemeClr val="tx1">
-                    <a:lumMod val="75000"/>
-                    <a:lumOff val="25000"/>
-                  </a:schemeClr>
-                </a:solidFill>
-                <a:latin typeface="+mn-lt"/>
-                <a:ea typeface="+mn-ea"/>
-                <a:cs typeface="+mn-cs"/>
+                <a:latin typeface="Bebas Neue"/>
+                <a:ea typeface="Bebas Neue"/>
+                <a:cs typeface="Bebas Neue"/>
+                <a:sym typeface="Bebas Neue"/>
               </a:defRPr>
             </a:lvl9pPr>
           </a:lstStyle>
           <a:p>
-            <a:pPr marL="590550" indent="-457200">
-              <a:buClr>
-                <a:schemeClr val="dk2"/>
-              </a:buClr>
-              <a:buAutoNum type="arabicPeriod"/>
+            <a:pPr marL="0" indent="0">
+              <a:spcAft>
+                <a:spcPts val="1600"/>
+              </a:spcAft>
             </a:pPr>
             <a:r>
-              <a:rPr lang="en-US" sz="1800" dirty="0">
-                <a:solidFill>
-                  <a:schemeClr val="dk2"/>
-                </a:solidFill>
+              <a:rPr lang="en-US" sz="2400" dirty="0">
+                <a:latin typeface="Arial" panose="020B0604020202020204" pitchFamily="34" charset="0"/>
+                <a:cs typeface="Arial" panose="020B0604020202020204" pitchFamily="34" charset="0"/>
               </a:rPr>
-              <a:t>Attempted 7 different model types</a:t>
+              <a:t>Churn ($) is from all regions of the US </a:t>
             </a:r>
           </a:p>
+        </p:txBody>
+      </p:sp>
+      <p:sp>
+        <p:nvSpPr>
+          <p:cNvPr id="10" name="Oval 9">
+            <a:extLst>
+              <a:ext uri="{FF2B5EF4-FFF2-40B4-BE49-F238E27FC236}">
+                <a16:creationId xmlns:a16="http://schemas.microsoft.com/office/drawing/2014/main" id="{EADE8348-A554-A730-C75A-288F69CB2749}"/>
+              </a:ext>
+            </a:extLst>
+          </p:cNvPr>
+          <p:cNvSpPr/>
+          <p:nvPr/>
+        </p:nvSpPr>
+        <p:spPr>
+          <a:xfrm>
+            <a:off x="6945407" y="2254062"/>
+            <a:ext cx="1189274" cy="1033743"/>
+          </a:xfrm>
+          <a:prstGeom prst="ellipse">
+            <a:avLst/>
+          </a:prstGeom>
+          <a:noFill/>
+        </p:spPr>
+        <p:style>
+          <a:lnRef idx="2">
+            <a:schemeClr val="accent1">
+              <a:shade val="50000"/>
+            </a:schemeClr>
+          </a:lnRef>
+          <a:fillRef idx="1">
+            <a:schemeClr val="accent1"/>
+          </a:fillRef>
+          <a:effectRef idx="0">
+            <a:schemeClr val="accent1"/>
+          </a:effectRef>
+          <a:fontRef idx="minor">
+            <a:schemeClr val="lt1"/>
+          </a:fontRef>
+        </p:style>
+        <p:txBody>
+          <a:bodyPr rtlCol="0" anchor="ctr"/>
+          <a:lstStyle/>
           <a:p>
-            <a:pPr marL="590550" indent="-457200">
-              <a:buClr>
-                <a:schemeClr val="dk2"/>
-              </a:buClr>
-              <a:buAutoNum type="arabicPeriod"/>
-            </a:pPr>
-            <a:endParaRPr lang="en-US" sz="1800" dirty="0">
-              <a:solidFill>
-                <a:schemeClr val="dk2"/>
-              </a:solidFill>
-            </a:endParaRPr>
-          </a:p>
-          <a:p>
-            <a:pPr marL="590550" indent="-457200">
-              <a:buClr>
-                <a:schemeClr val="dk2"/>
-              </a:buClr>
-              <a:buAutoNum type="arabicPeriod"/>
-            </a:pPr>
-            <a:r>
-              <a:rPr lang="en-US" sz="1800" dirty="0">
-                <a:solidFill>
-                  <a:schemeClr val="dk2"/>
-                </a:solidFill>
-              </a:rPr>
-              <a:t>Selected top 2 types for further refining</a:t>
-            </a:r>
+            <a:pPr algn="ctr"/>
+            <a:endParaRPr lang="en-US"/>
           </a:p>
         </p:txBody>
       </p:sp>
       <p:pic>
         <p:nvPicPr>
-          <p:cNvPr id="6" name="Picture 5">
+          <p:cNvPr id="5" name="Picture 4">
             <a:extLst>
               <a:ext uri="{FF2B5EF4-FFF2-40B4-BE49-F238E27FC236}">
-                <a16:creationId xmlns:a16="http://schemas.microsoft.com/office/drawing/2014/main" id="{0EBF1394-83CF-18B6-38C6-6B0B02059B39}"/>
+                <a16:creationId xmlns:a16="http://schemas.microsoft.com/office/drawing/2014/main" id="{5D0162E2-C8CB-4864-F6AD-3A7B9F513AA3}"/>
               </a:ext>
             </a:extLst>
           </p:cNvPr>
@@ -22269,70 +22321,20 @@
         </p:blipFill>
         <p:spPr>
           <a:xfrm>
-            <a:off x="4316181" y="1943012"/>
-            <a:ext cx="4508636" cy="2750101"/>
+            <a:off x="3856023" y="1881070"/>
+            <a:ext cx="4691170" cy="3024996"/>
           </a:xfrm>
           <a:prstGeom prst="rect">
             <a:avLst/>
           </a:prstGeom>
-          <a:ln>
-            <a:solidFill>
-              <a:schemeClr val="tx1"/>
-            </a:solidFill>
-          </a:ln>
         </p:spPr>
       </p:pic>
-      <p:sp>
-        <p:nvSpPr>
-          <p:cNvPr id="3" name="Rectangle 2">
-            <a:extLst>
-              <a:ext uri="{FF2B5EF4-FFF2-40B4-BE49-F238E27FC236}">
-                <a16:creationId xmlns:a16="http://schemas.microsoft.com/office/drawing/2014/main" id="{0F8669DE-462C-EB6C-BD4E-830102D86223}"/>
-              </a:ext>
-            </a:extLst>
-          </p:cNvPr>
-          <p:cNvSpPr/>
-          <p:nvPr/>
-        </p:nvSpPr>
-        <p:spPr>
-          <a:xfrm>
-            <a:off x="4429125" y="2076450"/>
-            <a:ext cx="1019175" cy="695325"/>
-          </a:xfrm>
-          <a:prstGeom prst="rect">
-            <a:avLst/>
-          </a:prstGeom>
-          <a:noFill/>
-          <a:ln>
-            <a:solidFill>
-              <a:srgbClr val="FF0000"/>
-            </a:solidFill>
-          </a:ln>
-        </p:spPr>
-        <p:style>
-          <a:lnRef idx="2">
-            <a:schemeClr val="accent2"/>
-          </a:lnRef>
-          <a:fillRef idx="1">
-            <a:schemeClr val="lt1"/>
-          </a:fillRef>
-          <a:effectRef idx="0">
-            <a:schemeClr val="accent2"/>
-          </a:effectRef>
-          <a:fontRef idx="minor">
-            <a:schemeClr val="dk1"/>
-          </a:fontRef>
-        </p:style>
-        <p:txBody>
-          <a:bodyPr rtlCol="0" anchor="ctr"/>
-          <a:lstStyle/>
-          <a:p>
-            <a:pPr algn="ctr"/>
-            <a:endParaRPr lang="en-US"/>
-          </a:p>
-        </p:txBody>
-      </p:sp>
     </p:spTree>
+    <p:extLst>
+      <p:ext uri="{BB962C8B-B14F-4D97-AF65-F5344CB8AC3E}">
+        <p14:creationId xmlns:p14="http://schemas.microsoft.com/office/powerpoint/2010/main" val="841396626"/>
+      </p:ext>
+    </p:extLst>
   </p:cSld>
   <p:clrMapOvr>
     <a:masterClrMapping/>
@@ -22393,15 +22395,7 @@
             </a:pPr>
             <a:r>
               <a:rPr lang="en" dirty="0"/>
-              <a:t>Best Model - </a:t>
-            </a:r>
-            <a:r>
-              <a:rPr lang="en-US" sz="2800" dirty="0">
-                <a:solidFill>
-                  <a:schemeClr val="bg1"/>
-                </a:solidFill>
-              </a:rPr>
-              <a:t>Gradient Boosting Classifier </a:t>
+              <a:t>Final Model </a:t>
             </a:r>
             <a:endParaRPr dirty="0">
               <a:solidFill>
@@ -22712,7 +22706,7 @@
               </a:buClr>
             </a:pPr>
             <a:r>
-              <a:rPr lang="en-US" sz="2000" b="1" dirty="0">
+              <a:rPr lang="en-US" sz="2800" b="1" dirty="0">
                 <a:solidFill>
                   <a:schemeClr val="dk2"/>
                 </a:solidFill>
@@ -22738,7 +22732,7 @@
         </p:nvSpPr>
         <p:spPr>
           <a:xfrm>
-            <a:off x="2632384" y="3906668"/>
+            <a:off x="2676301" y="4166200"/>
             <a:ext cx="3693862" cy="977300"/>
           </a:xfrm>
           <a:prstGeom prst="rect">
@@ -22984,9 +22978,9 @@
               </a:buClr>
             </a:pPr>
             <a:r>
-              <a:rPr lang="en-US" sz="2000" i="1" dirty="0">
+              <a:rPr lang="en-US" sz="2000" b="1" i="1" dirty="0">
                 <a:solidFill>
-                  <a:schemeClr val="dk2"/>
+                  <a:schemeClr val="tx1"/>
                 </a:solidFill>
               </a:rPr>
               <a:t>So…what does this mean?</a:t>
@@ -23036,8 +23030,8 @@
         </p:nvSpPr>
         <p:spPr>
           <a:xfrm>
-            <a:off x="2995751" y="631026"/>
-            <a:ext cx="2528008" cy="667500"/>
+            <a:off x="2995750" y="631026"/>
+            <a:ext cx="2947849" cy="667500"/>
           </a:xfrm>
           <a:prstGeom prst="rect">
             <a:avLst/>
@@ -23060,7 +23054,7 @@
             </a:pPr>
             <a:r>
               <a:rPr lang="en" dirty="0"/>
-              <a:t>Model Results</a:t>
+              <a:t>Key Take Aways</a:t>
             </a:r>
             <a:endParaRPr dirty="0"/>
           </a:p>
@@ -23082,8 +23076,8 @@
         </p:nvSpPr>
         <p:spPr>
           <a:xfrm>
-            <a:off x="310517" y="2035517"/>
-            <a:ext cx="3949238" cy="2790013"/>
+            <a:off x="442007" y="2078047"/>
+            <a:ext cx="7468615" cy="2790013"/>
           </a:xfrm>
           <a:prstGeom prst="rect">
             <a:avLst/>
@@ -23362,7 +23356,7 @@
                   <a:schemeClr val="dk2"/>
                 </a:solidFill>
               </a:rPr>
-              <a:t>Recall = 80% (100/125)</a:t>
+              <a:t>Recall = 80%: (100/125 customers)</a:t>
             </a:r>
           </a:p>
           <a:p>
@@ -23393,41 +23387,338 @@
                   <a:schemeClr val="dk2"/>
                 </a:solidFill>
               </a:rPr>
-              <a:t>Precision = 100% (100/100)</a:t>
+              <a:t>Precision = 100% (100/100 customers)</a:t>
             </a:r>
           </a:p>
         </p:txBody>
       </p:sp>
       <p:pic>
         <p:nvPicPr>
-          <p:cNvPr id="2" name="Picture 1">
+          <p:cNvPr id="1026" name="Picture 2" descr="Target Icon | 100 Free Solid Iconset | Roundicons.com">
             <a:extLst>
               <a:ext uri="{FF2B5EF4-FFF2-40B4-BE49-F238E27FC236}">
-                <a16:creationId xmlns:a16="http://schemas.microsoft.com/office/drawing/2014/main" id="{3BFBAECB-3016-2F51-6357-185852A67A93}"/>
+                <a16:creationId xmlns:a16="http://schemas.microsoft.com/office/drawing/2014/main" id="{B03F2CCD-9FC1-51CF-1099-0C74C0E4A8DF}"/>
               </a:ext>
             </a:extLst>
           </p:cNvPr>
           <p:cNvPicPr>
-            <a:picLocks noChangeAspect="1"/>
+            <a:picLocks noChangeAspect="1" noChangeArrowheads="1"/>
           </p:cNvPicPr>
           <p:nvPr/>
         </p:nvPicPr>
         <p:blipFill>
-          <a:blip r:embed="rId3"/>
+          <a:blip r:embed="rId3">
+            <a:extLst>
+              <a:ext uri="{28A0092B-C50C-407E-A947-70E740481C1C}">
+                <a14:useLocalDpi xmlns:a14="http://schemas.microsoft.com/office/drawing/2010/main" val="0"/>
+              </a:ext>
+            </a:extLst>
+          </a:blip>
+          <a:srcRect/>
           <a:stretch>
             <a:fillRect/>
           </a:stretch>
         </p:blipFill>
-        <p:spPr>
+        <p:spPr bwMode="auto">
           <a:xfrm>
-            <a:off x="4815842" y="1754886"/>
-            <a:ext cx="4189095" cy="3351276"/>
+            <a:off x="6602819" y="2375759"/>
+            <a:ext cx="1499189" cy="1499189"/>
           </a:xfrm>
           <a:prstGeom prst="rect">
             <a:avLst/>
           </a:prstGeom>
+          <a:noFill/>
+          <a:extLst>
+            <a:ext uri="{909E8E84-426E-40DD-AFC4-6F175D3DCCD1}">
+              <a14:hiddenFill xmlns:a14="http://schemas.microsoft.com/office/drawing/2010/main">
+                <a:solidFill>
+                  <a:srgbClr val="FFFFFF"/>
+                </a:solidFill>
+              </a14:hiddenFill>
+            </a:ext>
+          </a:extLst>
         </p:spPr>
       </p:pic>
+      <p:sp>
+        <p:nvSpPr>
+          <p:cNvPr id="4" name="Google Shape;227;p29">
+            <a:extLst>
+              <a:ext uri="{FF2B5EF4-FFF2-40B4-BE49-F238E27FC236}">
+                <a16:creationId xmlns:a16="http://schemas.microsoft.com/office/drawing/2014/main" id="{4A370C53-E9F5-0431-7A28-0858C669C5A7}"/>
+              </a:ext>
+            </a:extLst>
+          </p:cNvPr>
+          <p:cNvSpPr txBox="1">
+            <a:spLocks/>
+          </p:cNvSpPr>
+          <p:nvPr/>
+        </p:nvSpPr>
+        <p:spPr>
+          <a:xfrm>
+            <a:off x="1560703" y="4360074"/>
+            <a:ext cx="6349919" cy="507986"/>
+          </a:xfrm>
+          <a:prstGeom prst="rect">
+            <a:avLst/>
+          </a:prstGeom>
+          <a:noFill/>
+        </p:spPr>
+        <p:txBody>
+          <a:bodyPr spcFirstLastPara="1" vert="horz" wrap="square" lIns="91425" tIns="91425" rIns="91425" bIns="91425" rtlCol="0" anchor="t" anchorCtr="0">
+            <a:noAutofit/>
+          </a:bodyPr>
+          <a:lstStyle>
+            <a:lvl1pPr marL="257175" lvl="0" indent="-257175" algn="l" defTabSz="342900" rtl="0" eaLnBrk="1" latinLnBrk="0" hangingPunct="1">
+              <a:spcBef>
+                <a:spcPts val="0"/>
+              </a:spcBef>
+              <a:spcAft>
+                <a:spcPts val="0"/>
+              </a:spcAft>
+              <a:buClr>
+                <a:schemeClr val="accent1"/>
+              </a:buClr>
+              <a:buSzPts val="1500"/>
+              <a:buFont typeface="Wingdings 3" charset="2"/>
+              <a:buNone/>
+              <a:defRPr sz="1350" b="0" i="0" kern="1200">
+                <a:solidFill>
+                  <a:schemeClr val="tx1">
+                    <a:lumMod val="75000"/>
+                    <a:lumOff val="25000"/>
+                  </a:schemeClr>
+                </a:solidFill>
+                <a:latin typeface="+mn-lt"/>
+                <a:ea typeface="+mn-ea"/>
+                <a:cs typeface="+mn-cs"/>
+              </a:defRPr>
+            </a:lvl1pPr>
+            <a:lvl2pPr marL="557213" lvl="1" indent="-214313" algn="l" defTabSz="342900" rtl="0" eaLnBrk="1" latinLnBrk="0" hangingPunct="1">
+              <a:spcBef>
+                <a:spcPts val="1600"/>
+              </a:spcBef>
+              <a:spcAft>
+                <a:spcPts val="0"/>
+              </a:spcAft>
+              <a:buClr>
+                <a:schemeClr val="accent1"/>
+              </a:buClr>
+              <a:buSzPts val="1500"/>
+              <a:buFont typeface="Wingdings 3" charset="2"/>
+              <a:buNone/>
+              <a:defRPr sz="1200" b="0" i="0" kern="1200">
+                <a:solidFill>
+                  <a:schemeClr val="tx1">
+                    <a:lumMod val="75000"/>
+                    <a:lumOff val="25000"/>
+                  </a:schemeClr>
+                </a:solidFill>
+                <a:latin typeface="+mn-lt"/>
+                <a:ea typeface="+mn-ea"/>
+                <a:cs typeface="+mn-cs"/>
+              </a:defRPr>
+            </a:lvl2pPr>
+            <a:lvl3pPr marL="857250" lvl="2" indent="-171450" algn="l" defTabSz="342900" rtl="0" eaLnBrk="1" latinLnBrk="0" hangingPunct="1">
+              <a:spcBef>
+                <a:spcPts val="1600"/>
+              </a:spcBef>
+              <a:spcAft>
+                <a:spcPts val="0"/>
+              </a:spcAft>
+              <a:buClr>
+                <a:schemeClr val="accent1"/>
+              </a:buClr>
+              <a:buSzPts val="1500"/>
+              <a:buFont typeface="Wingdings 3" charset="2"/>
+              <a:buNone/>
+              <a:defRPr sz="1050" b="0" i="0" kern="1200">
+                <a:solidFill>
+                  <a:schemeClr val="tx1">
+                    <a:lumMod val="75000"/>
+                    <a:lumOff val="25000"/>
+                  </a:schemeClr>
+                </a:solidFill>
+                <a:latin typeface="+mn-lt"/>
+                <a:ea typeface="+mn-ea"/>
+                <a:cs typeface="+mn-cs"/>
+              </a:defRPr>
+            </a:lvl3pPr>
+            <a:lvl4pPr marL="1200150" lvl="3" indent="-171450" algn="l" defTabSz="342900" rtl="0" eaLnBrk="1" latinLnBrk="0" hangingPunct="1">
+              <a:spcBef>
+                <a:spcPts val="1600"/>
+              </a:spcBef>
+              <a:spcAft>
+                <a:spcPts val="0"/>
+              </a:spcAft>
+              <a:buClr>
+                <a:schemeClr val="accent1"/>
+              </a:buClr>
+              <a:buSzPts val="1500"/>
+              <a:buFont typeface="Wingdings 3" charset="2"/>
+              <a:buNone/>
+              <a:defRPr sz="900" b="0" i="0" kern="1200">
+                <a:solidFill>
+                  <a:schemeClr val="tx1">
+                    <a:lumMod val="75000"/>
+                    <a:lumOff val="25000"/>
+                  </a:schemeClr>
+                </a:solidFill>
+                <a:latin typeface="+mn-lt"/>
+                <a:ea typeface="+mn-ea"/>
+                <a:cs typeface="+mn-cs"/>
+              </a:defRPr>
+            </a:lvl4pPr>
+            <a:lvl5pPr marL="1543050" lvl="4" indent="-171450" algn="l" defTabSz="342900" rtl="0" eaLnBrk="1" latinLnBrk="0" hangingPunct="1">
+              <a:spcBef>
+                <a:spcPts val="1600"/>
+              </a:spcBef>
+              <a:spcAft>
+                <a:spcPts val="0"/>
+              </a:spcAft>
+              <a:buClr>
+                <a:schemeClr val="accent1"/>
+              </a:buClr>
+              <a:buSzPts val="1500"/>
+              <a:buFont typeface="Wingdings 3" charset="2"/>
+              <a:buNone/>
+              <a:defRPr sz="900" b="0" i="0" kern="1200">
+                <a:solidFill>
+                  <a:schemeClr val="tx1">
+                    <a:lumMod val="75000"/>
+                    <a:lumOff val="25000"/>
+                  </a:schemeClr>
+                </a:solidFill>
+                <a:latin typeface="+mn-lt"/>
+                <a:ea typeface="+mn-ea"/>
+                <a:cs typeface="+mn-cs"/>
+              </a:defRPr>
+            </a:lvl5pPr>
+            <a:lvl6pPr marL="1885950" lvl="5" indent="-171450" algn="l" defTabSz="342900" rtl="0" eaLnBrk="1" latinLnBrk="0" hangingPunct="1">
+              <a:spcBef>
+                <a:spcPts val="1600"/>
+              </a:spcBef>
+              <a:spcAft>
+                <a:spcPts val="0"/>
+              </a:spcAft>
+              <a:buClr>
+                <a:schemeClr val="accent1"/>
+              </a:buClr>
+              <a:buSzPts val="1500"/>
+              <a:buFont typeface="Wingdings 3" charset="2"/>
+              <a:buNone/>
+              <a:defRPr sz="900" b="0" i="0" kern="1200">
+                <a:solidFill>
+                  <a:schemeClr val="tx1">
+                    <a:lumMod val="75000"/>
+                    <a:lumOff val="25000"/>
+                  </a:schemeClr>
+                </a:solidFill>
+                <a:latin typeface="+mn-lt"/>
+                <a:ea typeface="+mn-ea"/>
+                <a:cs typeface="+mn-cs"/>
+              </a:defRPr>
+            </a:lvl6pPr>
+            <a:lvl7pPr marL="2228850" lvl="6" indent="-171450" algn="l" defTabSz="342900" rtl="0" eaLnBrk="1" latinLnBrk="0" hangingPunct="1">
+              <a:spcBef>
+                <a:spcPts val="1600"/>
+              </a:spcBef>
+              <a:spcAft>
+                <a:spcPts val="0"/>
+              </a:spcAft>
+              <a:buClr>
+                <a:schemeClr val="accent1"/>
+              </a:buClr>
+              <a:buSzPts val="1500"/>
+              <a:buFont typeface="Wingdings 3" charset="2"/>
+              <a:buNone/>
+              <a:defRPr sz="900" b="0" i="0" kern="1200">
+                <a:solidFill>
+                  <a:schemeClr val="tx1">
+                    <a:lumMod val="75000"/>
+                    <a:lumOff val="25000"/>
+                  </a:schemeClr>
+                </a:solidFill>
+                <a:latin typeface="+mn-lt"/>
+                <a:ea typeface="+mn-ea"/>
+                <a:cs typeface="+mn-cs"/>
+              </a:defRPr>
+            </a:lvl7pPr>
+            <a:lvl8pPr marL="2571750" lvl="7" indent="-171450" algn="l" defTabSz="342900" rtl="0" eaLnBrk="1" latinLnBrk="0" hangingPunct="1">
+              <a:spcBef>
+                <a:spcPts val="1600"/>
+              </a:spcBef>
+              <a:spcAft>
+                <a:spcPts val="0"/>
+              </a:spcAft>
+              <a:buClr>
+                <a:schemeClr val="accent1"/>
+              </a:buClr>
+              <a:buSzPts val="1500"/>
+              <a:buFont typeface="Wingdings 3" charset="2"/>
+              <a:buNone/>
+              <a:defRPr sz="900" b="0" i="0" kern="1200">
+                <a:solidFill>
+                  <a:schemeClr val="tx1">
+                    <a:lumMod val="75000"/>
+                    <a:lumOff val="25000"/>
+                  </a:schemeClr>
+                </a:solidFill>
+                <a:latin typeface="+mn-lt"/>
+                <a:ea typeface="+mn-ea"/>
+                <a:cs typeface="+mn-cs"/>
+              </a:defRPr>
+            </a:lvl8pPr>
+            <a:lvl9pPr marL="2914650" lvl="8" indent="-171450" algn="l" defTabSz="342900" rtl="0" eaLnBrk="1" latinLnBrk="0" hangingPunct="1">
+              <a:spcBef>
+                <a:spcPts val="1600"/>
+              </a:spcBef>
+              <a:spcAft>
+                <a:spcPts val="1600"/>
+              </a:spcAft>
+              <a:buClr>
+                <a:schemeClr val="accent1"/>
+              </a:buClr>
+              <a:buSzPts val="1500"/>
+              <a:buFont typeface="Wingdings 3" charset="2"/>
+              <a:buNone/>
+              <a:defRPr sz="900" b="0" i="0" kern="1200">
+                <a:solidFill>
+                  <a:schemeClr val="tx1">
+                    <a:lumMod val="75000"/>
+                    <a:lumOff val="25000"/>
+                  </a:schemeClr>
+                </a:solidFill>
+                <a:latin typeface="+mn-lt"/>
+                <a:ea typeface="+mn-ea"/>
+                <a:cs typeface="+mn-cs"/>
+              </a:defRPr>
+            </a:lvl9pPr>
+          </a:lstStyle>
+          <a:p>
+            <a:pPr marL="133350" indent="0">
+              <a:buClr>
+                <a:schemeClr val="dk2"/>
+              </a:buClr>
+            </a:pPr>
+            <a:r>
+              <a:rPr lang="en-US" sz="2000" b="1" i="1" dirty="0" err="1">
+                <a:solidFill>
+                  <a:schemeClr val="tx1"/>
+                </a:solidFill>
+              </a:rPr>
+              <a:t>SyriaTel’s</a:t>
+            </a:r>
+            <a:r>
+              <a:rPr lang="en-US" sz="2000" b="1" i="1" dirty="0">
+                <a:solidFill>
+                  <a:schemeClr val="tx1"/>
+                </a:solidFill>
+              </a:rPr>
+              <a:t> time and resources will not be wasted!</a:t>
+            </a:r>
+          </a:p>
+        </p:txBody>
+      </p:sp>
     </p:spTree>
   </p:cSld>
   <p:clrMapOvr>
@@ -23513,8 +23804,8 @@
         </p:nvSpPr>
         <p:spPr>
           <a:xfrm>
-            <a:off x="1243852" y="2281475"/>
-            <a:ext cx="7235047" cy="2123700"/>
+            <a:off x="1243852" y="2281474"/>
+            <a:ext cx="7235047" cy="2396851"/>
           </a:xfrm>
           <a:prstGeom prst="rect">
             <a:avLst/>
@@ -23541,7 +23832,7 @@
                 <a:latin typeface="Arial" panose="020B0604020202020204" pitchFamily="34" charset="0"/>
                 <a:cs typeface="Arial" panose="020B0604020202020204" pitchFamily="34" charset="0"/>
               </a:rPr>
-              <a:t>Focus on the 80% of customers that are flagged by the model</a:t>
+              <a:t>At the end of each quarter, feed model with active customer list</a:t>
             </a:r>
           </a:p>
           <a:p>
@@ -23576,7 +23867,23 @@
                 <a:latin typeface="Arial" panose="020B0604020202020204" pitchFamily="34" charset="0"/>
                 <a:cs typeface="Arial" panose="020B0604020202020204" pitchFamily="34" charset="0"/>
               </a:rPr>
-              <a:t>Provide these customers with one-time incentives or consider “unlimited” plans</a:t>
+              <a:t>Focus on customers that are identified by the model</a:t>
+            </a:r>
+          </a:p>
+          <a:p>
+            <a:pPr marL="585788" lvl="1" indent="-285750">
+              <a:spcBef>
+                <a:spcPts val="0"/>
+              </a:spcBef>
+              <a:buFont typeface="Arial" panose="020B0604020202020204" pitchFamily="34" charset="0"/>
+              <a:buChar char="•"/>
+            </a:pPr>
+            <a:r>
+              <a:rPr lang="en-US" sz="1650" dirty="0">
+                <a:latin typeface="Arial" panose="020B0604020202020204" pitchFamily="34" charset="0"/>
+                <a:cs typeface="Arial" panose="020B0604020202020204" pitchFamily="34" charset="0"/>
+              </a:rPr>
+              <a:t>Prioritize newly flagged customers</a:t>
             </a:r>
           </a:p>
           <a:p>
@@ -23611,9 +23918,21 @@
                 <a:latin typeface="Arial" panose="020B0604020202020204" pitchFamily="34" charset="0"/>
                 <a:cs typeface="Arial" panose="020B0604020202020204" pitchFamily="34" charset="0"/>
               </a:rPr>
-              <a:t>Consider implementing customer surveys to help identify the other 20%</a:t>
+              <a:t>Provide these customers with one-time incentives or consider rolling out “unlimited” plans by region</a:t>
             </a:r>
-            <a:endParaRPr sz="1800" dirty="0">
+          </a:p>
+          <a:p>
+            <a:pPr marL="228600" lvl="0" indent="-228600" algn="l" rtl="0">
+              <a:spcBef>
+                <a:spcPts val="0"/>
+              </a:spcBef>
+              <a:spcAft>
+                <a:spcPts val="0"/>
+              </a:spcAft>
+              <a:buFont typeface="+mj-lt"/>
+              <a:buAutoNum type="arabicPeriod"/>
+            </a:pPr>
+            <a:endParaRPr lang="en-US" sz="1800" dirty="0">
               <a:latin typeface="Arial" panose="020B0604020202020204" pitchFamily="34" charset="0"/>
               <a:cs typeface="Arial" panose="020B0604020202020204" pitchFamily="34" charset="0"/>
             </a:endParaRPr>

</xml_diff>

<commit_message>
finalize readme and presentation
</commit_message>
<xml_diff>
--- a/Phase 3 Presentation.pptx
+++ b/Phase 3 Presentation.pptx
@@ -2095,7 +2095,7 @@
             <a:fld id="{B61BEF0D-F0BB-DE4B-95CE-6DB70DBA9567}" type="datetimeFigureOut">
               <a:rPr lang="en-US" smtClean="0"/>
               <a:pPr/>
-              <a:t>8/25/2022</a:t>
+              <a:t>8/26/2022</a:t>
             </a:fld>
             <a:endParaRPr lang="en-US" dirty="0"/>
           </a:p>
@@ -3186,7 +3186,7 @@
             <a:fld id="{B61BEF0D-F0BB-DE4B-95CE-6DB70DBA9567}" type="datetimeFigureOut">
               <a:rPr lang="en-US" smtClean="0"/>
               <a:pPr/>
-              <a:t>8/25/2022</a:t>
+              <a:t>8/26/2022</a:t>
             </a:fld>
             <a:endParaRPr lang="en-US" dirty="0"/>
           </a:p>
@@ -4169,7 +4169,7 @@
             <a:fld id="{B61BEF0D-F0BB-DE4B-95CE-6DB70DBA9567}" type="datetimeFigureOut">
               <a:rPr lang="en-US" smtClean="0"/>
               <a:pPr/>
-              <a:t>8/25/2022</a:t>
+              <a:t>8/26/2022</a:t>
             </a:fld>
             <a:endParaRPr lang="en-US" dirty="0"/>
           </a:p>
@@ -5306,7 +5306,7 @@
             <a:fld id="{B61BEF0D-F0BB-DE4B-95CE-6DB70DBA9567}" type="datetimeFigureOut">
               <a:rPr lang="en-US" smtClean="0"/>
               <a:pPr/>
-              <a:t>8/25/2022</a:t>
+              <a:t>8/26/2022</a:t>
             </a:fld>
             <a:endParaRPr lang="en-US" dirty="0"/>
           </a:p>
@@ -6342,7 +6342,7 @@
             <a:fld id="{B61BEF0D-F0BB-DE4B-95CE-6DB70DBA9567}" type="datetimeFigureOut">
               <a:rPr lang="en-US" smtClean="0"/>
               <a:pPr/>
-              <a:t>8/25/2022</a:t>
+              <a:t>8/26/2022</a:t>
             </a:fld>
             <a:endParaRPr lang="en-US" dirty="0"/>
           </a:p>
@@ -7005,7 +7005,7 @@
             <a:fld id="{B61BEF0D-F0BB-DE4B-95CE-6DB70DBA9567}" type="datetimeFigureOut">
               <a:rPr lang="en-US" smtClean="0"/>
               <a:pPr/>
-              <a:t>8/25/2022</a:t>
+              <a:t>8/26/2022</a:t>
             </a:fld>
             <a:endParaRPr lang="en-US" dirty="0"/>
           </a:p>
@@ -7869,7 +7869,7 @@
             <a:fld id="{B61BEF0D-F0BB-DE4B-95CE-6DB70DBA9567}" type="datetimeFigureOut">
               <a:rPr lang="en-US" smtClean="0"/>
               <a:pPr/>
-              <a:t>8/25/2022</a:t>
+              <a:t>8/26/2022</a:t>
             </a:fld>
             <a:endParaRPr lang="en-US" dirty="0"/>
           </a:p>
@@ -8062,7 +8062,7 @@
             <a:fld id="{B61BEF0D-F0BB-DE4B-95CE-6DB70DBA9567}" type="datetimeFigureOut">
               <a:rPr lang="en-US" smtClean="0"/>
               <a:pPr/>
-              <a:t>8/25/2022</a:t>
+              <a:t>8/26/2022</a:t>
             </a:fld>
             <a:endParaRPr lang="en-US" dirty="0"/>
           </a:p>
@@ -9037,7 +9037,7 @@
             <a:fld id="{B61BEF0D-F0BB-DE4B-95CE-6DB70DBA9567}" type="datetimeFigureOut">
               <a:rPr lang="en-US" smtClean="0"/>
               <a:pPr/>
-              <a:t>8/25/2022</a:t>
+              <a:t>8/26/2022</a:t>
             </a:fld>
             <a:endParaRPr lang="en-US" dirty="0"/>
           </a:p>
@@ -11746,7 +11746,7 @@
             <a:fld id="{B61BEF0D-F0BB-DE4B-95CE-6DB70DBA9567}" type="datetimeFigureOut">
               <a:rPr lang="en-US" smtClean="0"/>
               <a:pPr/>
-              <a:t>8/25/2022</a:t>
+              <a:t>8/26/2022</a:t>
             </a:fld>
             <a:endParaRPr lang="en-US" dirty="0"/>
           </a:p>
@@ -14668,7 +14668,7 @@
             <a:fld id="{B61BEF0D-F0BB-DE4B-95CE-6DB70DBA9567}" type="datetimeFigureOut">
               <a:rPr lang="en-US" smtClean="0"/>
               <a:pPr/>
-              <a:t>8/25/2022</a:t>
+              <a:t>8/26/2022</a:t>
             </a:fld>
             <a:endParaRPr lang="en-US" dirty="0"/>
           </a:p>
@@ -14943,7 +14943,7 @@
             <a:fld id="{B61BEF0D-F0BB-DE4B-95CE-6DB70DBA9567}" type="datetimeFigureOut">
               <a:rPr lang="en-US" smtClean="0"/>
               <a:pPr/>
-              <a:t>8/25/2022</a:t>
+              <a:t>8/26/2022</a:t>
             </a:fld>
             <a:endParaRPr lang="en-US" dirty="0"/>
           </a:p>
@@ -15356,7 +15356,7 @@
             <a:fld id="{B61BEF0D-F0BB-DE4B-95CE-6DB70DBA9567}" type="datetimeFigureOut">
               <a:rPr lang="en-US" smtClean="0"/>
               <a:pPr/>
-              <a:t>8/25/2022</a:t>
+              <a:t>8/26/2022</a:t>
             </a:fld>
             <a:endParaRPr lang="en-US" dirty="0"/>
           </a:p>
@@ -15486,7 +15486,7 @@
             <a:fld id="{B61BEF0D-F0BB-DE4B-95CE-6DB70DBA9567}" type="datetimeFigureOut">
               <a:rPr lang="en-US" smtClean="0"/>
               <a:pPr/>
-              <a:t>8/25/2022</a:t>
+              <a:t>8/26/2022</a:t>
             </a:fld>
             <a:endParaRPr lang="en-US" dirty="0"/>
           </a:p>
@@ -15584,7 +15584,7 @@
             <a:fld id="{B61BEF0D-F0BB-DE4B-95CE-6DB70DBA9567}" type="datetimeFigureOut">
               <a:rPr lang="en-US" smtClean="0"/>
               <a:pPr/>
-              <a:t>8/25/2022</a:t>
+              <a:t>8/26/2022</a:t>
             </a:fld>
             <a:endParaRPr lang="en-US" dirty="0"/>
           </a:p>
@@ -16667,7 +16667,7 @@
             <a:fld id="{B61BEF0D-F0BB-DE4B-95CE-6DB70DBA9567}" type="datetimeFigureOut">
               <a:rPr lang="en-US" smtClean="0"/>
               <a:pPr/>
-              <a:t>8/25/2022</a:t>
+              <a:t>8/26/2022</a:t>
             </a:fld>
             <a:endParaRPr lang="en-US" dirty="0"/>
           </a:p>
@@ -17778,7 +17778,7 @@
             <a:fld id="{B61BEF0D-F0BB-DE4B-95CE-6DB70DBA9567}" type="datetimeFigureOut">
               <a:rPr lang="en-US" smtClean="0"/>
               <a:pPr/>
-              <a:t>8/25/2022</a:t>
+              <a:t>8/26/2022</a:t>
             </a:fld>
             <a:endParaRPr lang="en-US" dirty="0"/>
           </a:p>
@@ -18778,7 +18778,7 @@
             <a:fld id="{B61BEF0D-F0BB-DE4B-95CE-6DB70DBA9567}" type="datetimeFigureOut">
               <a:rPr lang="en-US" smtClean="0"/>
               <a:pPr/>
-              <a:t>8/25/2022</a:t>
+              <a:t>8/26/2022</a:t>
             </a:fld>
             <a:endParaRPr lang="en-US" dirty="0"/>
           </a:p>
@@ -20280,6 +20280,16 @@
               <a:buChar char="•"/>
             </a:pPr>
             <a:r>
+              <a:rPr lang="en-US" sz="2000" i="1" u="sng" dirty="0">
+                <a:solidFill>
+                  <a:sysClr val="windowText" lastClr="000000"/>
+                </a:solidFill>
+                <a:latin typeface="Arial" panose="020B0604020202020204" pitchFamily="34" charset="0"/>
+                <a:cs typeface="Arial" panose="020B0604020202020204" pitchFamily="34" charset="0"/>
+              </a:rPr>
+              <a:t>Objective</a:t>
+            </a:r>
+            <a:r>
               <a:rPr lang="en-US" sz="2000" dirty="0">
                 <a:solidFill>
                   <a:sysClr val="windowText" lastClr="000000"/>
@@ -20287,7 +20297,7 @@
                 <a:latin typeface="Arial" panose="020B0604020202020204" pitchFamily="34" charset="0"/>
                 <a:cs typeface="Arial" panose="020B0604020202020204" pitchFamily="34" charset="0"/>
               </a:rPr>
-              <a:t>Identify current customers likely to churn</a:t>
+              <a:t>: Predict which customers are likely to churn</a:t>
             </a:r>
           </a:p>
         </p:txBody>

</xml_diff>

<commit_message>
final changes to notebook. PPt to pdf.
</commit_message>
<xml_diff>
--- a/Phase 3 Presentation.pptx
+++ b/Phase 3 Presentation.pptx
@@ -2095,7 +2095,7 @@
             <a:fld id="{B61BEF0D-F0BB-DE4B-95CE-6DB70DBA9567}" type="datetimeFigureOut">
               <a:rPr lang="en-US" smtClean="0"/>
               <a:pPr/>
-              <a:t>8/26/2022</a:t>
+              <a:t>8/29/2022</a:t>
             </a:fld>
             <a:endParaRPr lang="en-US" dirty="0"/>
           </a:p>
@@ -3186,7 +3186,7 @@
             <a:fld id="{B61BEF0D-F0BB-DE4B-95CE-6DB70DBA9567}" type="datetimeFigureOut">
               <a:rPr lang="en-US" smtClean="0"/>
               <a:pPr/>
-              <a:t>8/26/2022</a:t>
+              <a:t>8/29/2022</a:t>
             </a:fld>
             <a:endParaRPr lang="en-US" dirty="0"/>
           </a:p>
@@ -4169,7 +4169,7 @@
             <a:fld id="{B61BEF0D-F0BB-DE4B-95CE-6DB70DBA9567}" type="datetimeFigureOut">
               <a:rPr lang="en-US" smtClean="0"/>
               <a:pPr/>
-              <a:t>8/26/2022</a:t>
+              <a:t>8/29/2022</a:t>
             </a:fld>
             <a:endParaRPr lang="en-US" dirty="0"/>
           </a:p>
@@ -5306,7 +5306,7 @@
             <a:fld id="{B61BEF0D-F0BB-DE4B-95CE-6DB70DBA9567}" type="datetimeFigureOut">
               <a:rPr lang="en-US" smtClean="0"/>
               <a:pPr/>
-              <a:t>8/26/2022</a:t>
+              <a:t>8/29/2022</a:t>
             </a:fld>
             <a:endParaRPr lang="en-US" dirty="0"/>
           </a:p>
@@ -6342,7 +6342,7 @@
             <a:fld id="{B61BEF0D-F0BB-DE4B-95CE-6DB70DBA9567}" type="datetimeFigureOut">
               <a:rPr lang="en-US" smtClean="0"/>
               <a:pPr/>
-              <a:t>8/26/2022</a:t>
+              <a:t>8/29/2022</a:t>
             </a:fld>
             <a:endParaRPr lang="en-US" dirty="0"/>
           </a:p>
@@ -7005,7 +7005,7 @@
             <a:fld id="{B61BEF0D-F0BB-DE4B-95CE-6DB70DBA9567}" type="datetimeFigureOut">
               <a:rPr lang="en-US" smtClean="0"/>
               <a:pPr/>
-              <a:t>8/26/2022</a:t>
+              <a:t>8/29/2022</a:t>
             </a:fld>
             <a:endParaRPr lang="en-US" dirty="0"/>
           </a:p>
@@ -7869,7 +7869,7 @@
             <a:fld id="{B61BEF0D-F0BB-DE4B-95CE-6DB70DBA9567}" type="datetimeFigureOut">
               <a:rPr lang="en-US" smtClean="0"/>
               <a:pPr/>
-              <a:t>8/26/2022</a:t>
+              <a:t>8/29/2022</a:t>
             </a:fld>
             <a:endParaRPr lang="en-US" dirty="0"/>
           </a:p>
@@ -8062,7 +8062,7 @@
             <a:fld id="{B61BEF0D-F0BB-DE4B-95CE-6DB70DBA9567}" type="datetimeFigureOut">
               <a:rPr lang="en-US" smtClean="0"/>
               <a:pPr/>
-              <a:t>8/26/2022</a:t>
+              <a:t>8/29/2022</a:t>
             </a:fld>
             <a:endParaRPr lang="en-US" dirty="0"/>
           </a:p>
@@ -9037,7 +9037,7 @@
             <a:fld id="{B61BEF0D-F0BB-DE4B-95CE-6DB70DBA9567}" type="datetimeFigureOut">
               <a:rPr lang="en-US" smtClean="0"/>
               <a:pPr/>
-              <a:t>8/26/2022</a:t>
+              <a:t>8/29/2022</a:t>
             </a:fld>
             <a:endParaRPr lang="en-US" dirty="0"/>
           </a:p>
@@ -11746,7 +11746,7 @@
             <a:fld id="{B61BEF0D-F0BB-DE4B-95CE-6DB70DBA9567}" type="datetimeFigureOut">
               <a:rPr lang="en-US" smtClean="0"/>
               <a:pPr/>
-              <a:t>8/26/2022</a:t>
+              <a:t>8/29/2022</a:t>
             </a:fld>
             <a:endParaRPr lang="en-US" dirty="0"/>
           </a:p>
@@ -14668,7 +14668,7 @@
             <a:fld id="{B61BEF0D-F0BB-DE4B-95CE-6DB70DBA9567}" type="datetimeFigureOut">
               <a:rPr lang="en-US" smtClean="0"/>
               <a:pPr/>
-              <a:t>8/26/2022</a:t>
+              <a:t>8/29/2022</a:t>
             </a:fld>
             <a:endParaRPr lang="en-US" dirty="0"/>
           </a:p>
@@ -14943,7 +14943,7 @@
             <a:fld id="{B61BEF0D-F0BB-DE4B-95CE-6DB70DBA9567}" type="datetimeFigureOut">
               <a:rPr lang="en-US" smtClean="0"/>
               <a:pPr/>
-              <a:t>8/26/2022</a:t>
+              <a:t>8/29/2022</a:t>
             </a:fld>
             <a:endParaRPr lang="en-US" dirty="0"/>
           </a:p>
@@ -15356,7 +15356,7 @@
             <a:fld id="{B61BEF0D-F0BB-DE4B-95CE-6DB70DBA9567}" type="datetimeFigureOut">
               <a:rPr lang="en-US" smtClean="0"/>
               <a:pPr/>
-              <a:t>8/26/2022</a:t>
+              <a:t>8/29/2022</a:t>
             </a:fld>
             <a:endParaRPr lang="en-US" dirty="0"/>
           </a:p>
@@ -15486,7 +15486,7 @@
             <a:fld id="{B61BEF0D-F0BB-DE4B-95CE-6DB70DBA9567}" type="datetimeFigureOut">
               <a:rPr lang="en-US" smtClean="0"/>
               <a:pPr/>
-              <a:t>8/26/2022</a:t>
+              <a:t>8/29/2022</a:t>
             </a:fld>
             <a:endParaRPr lang="en-US" dirty="0"/>
           </a:p>
@@ -15584,7 +15584,7 @@
             <a:fld id="{B61BEF0D-F0BB-DE4B-95CE-6DB70DBA9567}" type="datetimeFigureOut">
               <a:rPr lang="en-US" smtClean="0"/>
               <a:pPr/>
-              <a:t>8/26/2022</a:t>
+              <a:t>8/29/2022</a:t>
             </a:fld>
             <a:endParaRPr lang="en-US" dirty="0"/>
           </a:p>
@@ -16667,7 +16667,7 @@
             <a:fld id="{B61BEF0D-F0BB-DE4B-95CE-6DB70DBA9567}" type="datetimeFigureOut">
               <a:rPr lang="en-US" smtClean="0"/>
               <a:pPr/>
-              <a:t>8/26/2022</a:t>
+              <a:t>8/29/2022</a:t>
             </a:fld>
             <a:endParaRPr lang="en-US" dirty="0"/>
           </a:p>
@@ -17778,7 +17778,7 @@
             <a:fld id="{B61BEF0D-F0BB-DE4B-95CE-6DB70DBA9567}" type="datetimeFigureOut">
               <a:rPr lang="en-US" smtClean="0"/>
               <a:pPr/>
-              <a:t>8/26/2022</a:t>
+              <a:t>8/29/2022</a:t>
             </a:fld>
             <a:endParaRPr lang="en-US" dirty="0"/>
           </a:p>
@@ -18778,7 +18778,7 @@
             <a:fld id="{B61BEF0D-F0BB-DE4B-95CE-6DB70DBA9567}" type="datetimeFigureOut">
               <a:rPr lang="en-US" smtClean="0"/>
               <a:pPr/>
-              <a:t>8/26/2022</a:t>
+              <a:t>8/29/2022</a:t>
             </a:fld>
             <a:endParaRPr lang="en-US" dirty="0"/>
           </a:p>
@@ -19356,7 +19356,7 @@
         </p:nvSpPr>
         <p:spPr>
           <a:xfrm>
-            <a:off x="1042157" y="1165459"/>
+            <a:off x="983736" y="938631"/>
             <a:ext cx="6954609" cy="1959300"/>
           </a:xfrm>
           <a:prstGeom prst="rect">
@@ -19381,6 +19381,13 @@
             <a:r>
               <a:rPr lang="en" dirty="0"/>
               <a:t>SyriaTel – Customer Churn Assessment</a:t>
+            </a:r>
+            <a:br>
+              <a:rPr lang="en" dirty="0"/>
+            </a:br>
+            <a:r>
+              <a:rPr lang="en" sz="1600" dirty="0"/>
+              <a:t>August 26, 2022</a:t>
             </a:r>
             <a:endParaRPr sz="5200" dirty="0"/>
           </a:p>
@@ -19398,7 +19405,7 @@
         </p:nvSpPr>
         <p:spPr>
           <a:xfrm>
-            <a:off x="983736" y="3070013"/>
+            <a:off x="2004462" y="2999129"/>
             <a:ext cx="4800600" cy="1460500"/>
           </a:xfrm>
           <a:prstGeom prst="rect">
@@ -19411,7 +19418,7 @@
           </a:bodyPr>
           <a:lstStyle/>
           <a:p>
-            <a:pPr marL="0" lvl="0" indent="0" algn="l" rtl="0">
+            <a:pPr marL="0" lvl="0" indent="0" algn="ctr" rtl="0">
               <a:spcBef>
                 <a:spcPts val="0"/>
               </a:spcBef>
@@ -19430,7 +19437,7 @@
             </a:r>
           </a:p>
           <a:p>
-            <a:pPr marL="0" lvl="0" indent="0" algn="l" rtl="0">
+            <a:pPr marL="0" lvl="0" indent="0" algn="ctr" rtl="0">
               <a:spcBef>
                 <a:spcPts val="0"/>
               </a:spcBef>
@@ -19449,7 +19456,7 @@
             </a:r>
           </a:p>
           <a:p>
-            <a:pPr marL="0" lvl="0" indent="0" algn="l" rtl="0">
+            <a:pPr marL="0" lvl="0" indent="0" algn="ctr" rtl="0">
               <a:spcBef>
                 <a:spcPts val="0"/>
               </a:spcBef>
@@ -19838,8 +19845,8 @@
         </p:nvSpPr>
         <p:spPr>
           <a:xfrm>
-            <a:off x="3255471" y="2571750"/>
-            <a:ext cx="4131445" cy="553968"/>
+            <a:off x="1543050" y="2464173"/>
+            <a:ext cx="6057899" cy="1846629"/>
           </a:xfrm>
           <a:prstGeom prst="rect">
             <a:avLst/>
@@ -19855,7 +19862,7 @@
           </a:bodyPr>
           <a:lstStyle/>
           <a:p>
-            <a:pPr marL="0" lvl="0" indent="0" algn="l" rtl="0">
+            <a:pPr marL="0" lvl="0" indent="0" algn="ctr" rtl="0">
               <a:spcBef>
                 <a:spcPts val="0"/>
               </a:spcBef>
@@ -19880,6 +19887,135 @@
                 <a:sym typeface="Raleway"/>
               </a:rPr>
               <a:t>Any questions?</a:t>
+            </a:r>
+          </a:p>
+          <a:p>
+            <a:pPr marL="0" lvl="0" indent="0" algn="ctr" rtl="0">
+              <a:spcBef>
+                <a:spcPts val="0"/>
+              </a:spcBef>
+              <a:spcAft>
+                <a:spcPts val="0"/>
+              </a:spcAft>
+              <a:buClr>
+                <a:schemeClr val="dk2"/>
+              </a:buClr>
+              <a:buSzPts val="1100"/>
+              <a:buFont typeface="Arial"/>
+              <a:buNone/>
+            </a:pPr>
+            <a:endParaRPr lang="en" sz="2400" dirty="0">
+              <a:solidFill>
+                <a:schemeClr val="dk2"/>
+              </a:solidFill>
+              <a:latin typeface="Raleway"/>
+              <a:ea typeface="Raleway"/>
+              <a:cs typeface="Raleway"/>
+              <a:sym typeface="Raleway"/>
+            </a:endParaRPr>
+          </a:p>
+          <a:p>
+            <a:pPr marL="0" lvl="0" indent="0" algn="ctr" rtl="0">
+              <a:spcBef>
+                <a:spcPts val="0"/>
+              </a:spcBef>
+              <a:spcAft>
+                <a:spcPts val="0"/>
+              </a:spcAft>
+              <a:buClr>
+                <a:schemeClr val="dk2"/>
+              </a:buClr>
+              <a:buSzPts val="1100"/>
+              <a:buFont typeface="Arial"/>
+              <a:buNone/>
+            </a:pPr>
+            <a:endParaRPr lang="en" sz="2400" dirty="0">
+              <a:solidFill>
+                <a:schemeClr val="dk2"/>
+              </a:solidFill>
+              <a:latin typeface="Raleway"/>
+              <a:ea typeface="Raleway"/>
+              <a:cs typeface="Raleway"/>
+              <a:sym typeface="Raleway"/>
+            </a:endParaRPr>
+          </a:p>
+          <a:p>
+            <a:pPr marL="0" lvl="0" indent="0" algn="ctr" rtl="0">
+              <a:spcBef>
+                <a:spcPts val="0"/>
+              </a:spcBef>
+              <a:spcAft>
+                <a:spcPts val="0"/>
+              </a:spcAft>
+              <a:buClr>
+                <a:schemeClr val="dk2"/>
+              </a:buClr>
+              <a:buSzPts val="1100"/>
+              <a:buFont typeface="Arial"/>
+              <a:buNone/>
+            </a:pPr>
+            <a:r>
+              <a:rPr lang="en" dirty="0">
+                <a:solidFill>
+                  <a:schemeClr val="dk2"/>
+                </a:solidFill>
+                <a:latin typeface="Raleway"/>
+                <a:ea typeface="Raleway"/>
+                <a:cs typeface="Raleway"/>
+                <a:sym typeface="Raleway"/>
+              </a:rPr>
+              <a:t>Email: </a:t>
+            </a:r>
+            <a:r>
+              <a:rPr lang="en" dirty="0">
+                <a:solidFill>
+                  <a:schemeClr val="dk2"/>
+                </a:solidFill>
+                <a:latin typeface="Raleway"/>
+                <a:ea typeface="Raleway"/>
+                <a:cs typeface="Raleway"/>
+                <a:sym typeface="Raleway"/>
+                <a:hlinkClick r:id="rId3"/>
+              </a:rPr>
+              <a:t>Ali.Rampurawala@gmail.com</a:t>
+            </a:r>
+            <a:endParaRPr lang="en" dirty="0">
+              <a:solidFill>
+                <a:schemeClr val="dk2"/>
+              </a:solidFill>
+              <a:latin typeface="Raleway"/>
+              <a:ea typeface="Raleway"/>
+              <a:cs typeface="Raleway"/>
+              <a:sym typeface="Raleway"/>
+            </a:endParaRPr>
+          </a:p>
+          <a:p>
+            <a:pPr marL="0" lvl="0" indent="0" algn="ctr" rtl="0">
+              <a:spcBef>
+                <a:spcPts val="0"/>
+              </a:spcBef>
+              <a:spcAft>
+                <a:spcPts val="0"/>
+              </a:spcAft>
+              <a:buClr>
+                <a:schemeClr val="dk2"/>
+              </a:buClr>
+              <a:buSzPts val="1100"/>
+              <a:buFont typeface="Arial"/>
+              <a:buNone/>
+            </a:pPr>
+            <a:r>
+              <a:rPr lang="en" dirty="0">
+                <a:solidFill>
+                  <a:schemeClr val="dk2"/>
+                </a:solidFill>
+                <a:latin typeface="Raleway"/>
+                <a:ea typeface="Raleway"/>
+                <a:cs typeface="Raleway"/>
+                <a:sym typeface="Raleway"/>
+                <a:hlinkClick r:id="rId4"/>
+              </a:rPr>
+              <a:t>Github Link</a:t>
             </a:r>
             <a:endParaRPr sz="2400" dirty="0">
               <a:latin typeface="Raleway"/>
@@ -21530,7 +21666,7 @@
                 <a:latin typeface="Arial" panose="020B0604020202020204" pitchFamily="34" charset="0"/>
                 <a:cs typeface="Arial" panose="020B0604020202020204" pitchFamily="34" charset="0"/>
               </a:rPr>
-              <a:t>Churn or no</a:t>
+              <a:t>Churn (~14%)</a:t>
             </a:r>
           </a:p>
         </p:txBody>
@@ -22257,7 +22393,7 @@
                 <a:latin typeface="Arial" panose="020B0604020202020204" pitchFamily="34" charset="0"/>
                 <a:cs typeface="Arial" panose="020B0604020202020204" pitchFamily="34" charset="0"/>
               </a:rPr>
-              <a:t>Churn ($) is from all regions of the US </a:t>
+              <a:t>Churn ($) is highest in the North</a:t>
             </a:r>
           </a:p>
         </p:txBody>
@@ -22331,7 +22467,7 @@
         </p:blipFill>
         <p:spPr>
           <a:xfrm>
-            <a:off x="3856023" y="1881070"/>
+            <a:off x="3904149" y="1905134"/>
             <a:ext cx="4691170" cy="3024996"/>
           </a:xfrm>
           <a:prstGeom prst="rect">
@@ -23842,7 +23978,7 @@
                 <a:latin typeface="Arial" panose="020B0604020202020204" pitchFamily="34" charset="0"/>
                 <a:cs typeface="Arial" panose="020B0604020202020204" pitchFamily="34" charset="0"/>
               </a:rPr>
-              <a:t>At the end of each quarter, feed model with active customer list</a:t>
+              <a:t>At the end of each quarter, feed model with active customer account data</a:t>
             </a:r>
           </a:p>
           <a:p>
@@ -23928,7 +24064,7 @@
                 <a:latin typeface="Arial" panose="020B0604020202020204" pitchFamily="34" charset="0"/>
                 <a:cs typeface="Arial" panose="020B0604020202020204" pitchFamily="34" charset="0"/>
               </a:rPr>
-              <a:t>Provide these customers with one-time incentives or consider rolling out “unlimited” plans by region</a:t>
+              <a:t>Provide discounts, consider rolling out “unlimited” plans by region, and assign top customer service reps</a:t>
             </a:r>
           </a:p>
           <a:p>

</xml_diff>